<commit_message>
Deploying to master from  @ 60d27f607b8d414fefe162bac0bbfab55ee02936 🚀
</commit_message>
<xml_diff>
--- a/tutorial/stable/slides/part1/figures/causalml.pptx
+++ b/tutorial/stable/slides/part1/figures/causalml.pptx
@@ -259,7 +259,7 @@
           <a:p>
             <a:fld id="{040CF3E3-213B-40BE-BA0A-0A3EDB94973A}" type="datetimeFigureOut">
               <a:rPr lang="de-DE" smtClean="0"/>
-              <a:t>08.06.2022</a:t>
+              <a:t>27.07.2022</a:t>
             </a:fld>
             <a:endParaRPr lang="de-DE"/>
           </a:p>
@@ -457,7 +457,7 @@
           <a:p>
             <a:fld id="{040CF3E3-213B-40BE-BA0A-0A3EDB94973A}" type="datetimeFigureOut">
               <a:rPr lang="de-DE" smtClean="0"/>
-              <a:t>08.06.2022</a:t>
+              <a:t>27.07.2022</a:t>
             </a:fld>
             <a:endParaRPr lang="de-DE"/>
           </a:p>
@@ -665,7 +665,7 @@
           <a:p>
             <a:fld id="{040CF3E3-213B-40BE-BA0A-0A3EDB94973A}" type="datetimeFigureOut">
               <a:rPr lang="de-DE" smtClean="0"/>
-              <a:t>08.06.2022</a:t>
+              <a:t>27.07.2022</a:t>
             </a:fld>
             <a:endParaRPr lang="de-DE"/>
           </a:p>
@@ -863,7 +863,7 @@
           <a:p>
             <a:fld id="{040CF3E3-213B-40BE-BA0A-0A3EDB94973A}" type="datetimeFigureOut">
               <a:rPr lang="de-DE" smtClean="0"/>
-              <a:t>08.06.2022</a:t>
+              <a:t>27.07.2022</a:t>
             </a:fld>
             <a:endParaRPr lang="de-DE"/>
           </a:p>
@@ -1138,7 +1138,7 @@
           <a:p>
             <a:fld id="{040CF3E3-213B-40BE-BA0A-0A3EDB94973A}" type="datetimeFigureOut">
               <a:rPr lang="de-DE" smtClean="0"/>
-              <a:t>08.06.2022</a:t>
+              <a:t>27.07.2022</a:t>
             </a:fld>
             <a:endParaRPr lang="de-DE"/>
           </a:p>
@@ -1403,7 +1403,7 @@
           <a:p>
             <a:fld id="{040CF3E3-213B-40BE-BA0A-0A3EDB94973A}" type="datetimeFigureOut">
               <a:rPr lang="de-DE" smtClean="0"/>
-              <a:t>08.06.2022</a:t>
+              <a:t>27.07.2022</a:t>
             </a:fld>
             <a:endParaRPr lang="de-DE"/>
           </a:p>
@@ -1815,7 +1815,7 @@
           <a:p>
             <a:fld id="{040CF3E3-213B-40BE-BA0A-0A3EDB94973A}" type="datetimeFigureOut">
               <a:rPr lang="de-DE" smtClean="0"/>
-              <a:t>08.06.2022</a:t>
+              <a:t>27.07.2022</a:t>
             </a:fld>
             <a:endParaRPr lang="de-DE"/>
           </a:p>
@@ -1956,7 +1956,7 @@
           <a:p>
             <a:fld id="{040CF3E3-213B-40BE-BA0A-0A3EDB94973A}" type="datetimeFigureOut">
               <a:rPr lang="de-DE" smtClean="0"/>
-              <a:t>08.06.2022</a:t>
+              <a:t>27.07.2022</a:t>
             </a:fld>
             <a:endParaRPr lang="de-DE"/>
           </a:p>
@@ -2069,7 +2069,7 @@
           <a:p>
             <a:fld id="{040CF3E3-213B-40BE-BA0A-0A3EDB94973A}" type="datetimeFigureOut">
               <a:rPr lang="de-DE" smtClean="0"/>
-              <a:t>08.06.2022</a:t>
+              <a:t>27.07.2022</a:t>
             </a:fld>
             <a:endParaRPr lang="de-DE"/>
           </a:p>
@@ -2380,7 +2380,7 @@
           <a:p>
             <a:fld id="{040CF3E3-213B-40BE-BA0A-0A3EDB94973A}" type="datetimeFigureOut">
               <a:rPr lang="de-DE" smtClean="0"/>
-              <a:t>08.06.2022</a:t>
+              <a:t>27.07.2022</a:t>
             </a:fld>
             <a:endParaRPr lang="de-DE"/>
           </a:p>
@@ -2668,7 +2668,7 @@
           <a:p>
             <a:fld id="{040CF3E3-213B-40BE-BA0A-0A3EDB94973A}" type="datetimeFigureOut">
               <a:rPr lang="de-DE" smtClean="0"/>
-              <a:t>08.06.2022</a:t>
+              <a:t>27.07.2022</a:t>
             </a:fld>
             <a:endParaRPr lang="de-DE"/>
           </a:p>
@@ -2909,7 +2909,7 @@
           <a:p>
             <a:fld id="{040CF3E3-213B-40BE-BA0A-0A3EDB94973A}" type="datetimeFigureOut">
               <a:rPr lang="de-DE" smtClean="0"/>
-              <a:t>08.06.2022</a:t>
+              <a:t>27.07.2022</a:t>
             </a:fld>
             <a:endParaRPr lang="de-DE"/>
           </a:p>
@@ -4045,8 +4045,19 @@
                   <a:latin typeface="Arial" panose="020B0604020202020204" pitchFamily="34" charset="0"/>
                   <a:cs typeface="Arial" panose="020B0604020202020204" pitchFamily="34" charset="0"/>
                 </a:rPr>
-                <a:t>Correlation based</a:t>
+                <a:t>Based on association </a:t>
               </a:r>
+              <a:r>
+                <a:rPr lang="en-US">
+                  <a:latin typeface="Arial" panose="020B0604020202020204" pitchFamily="34" charset="0"/>
+                  <a:cs typeface="Arial" panose="020B0604020202020204" pitchFamily="34" charset="0"/>
+                </a:rPr>
+                <a:t>(correlation)</a:t>
+              </a:r>
+              <a:endParaRPr lang="en-US" dirty="0">
+                <a:latin typeface="Arial" panose="020B0604020202020204" pitchFamily="34" charset="0"/>
+                <a:cs typeface="Arial" panose="020B0604020202020204" pitchFamily="34" charset="0"/>
+              </a:endParaRPr>
             </a:p>
             <a:p>
               <a:pPr marL="287322" lvl="1" indent="-285750" algn="l">

</xml_diff>